<commit_message>
master: smaller improvements on documentation and presentation
</commit_message>
<xml_diff>
--- a/Presentation.pptx
+++ b/Presentation.pptx
@@ -3007,7 +3007,7 @@
           <a:p>
             <a:fld id="{4929A4FD-FAFB-4CDA-9DC5-D20CA18269A9}" type="datetimeFigureOut">
               <a:rPr lang="en-US" smtClean="0"/>
-              <a:t>5/29/2019</a:t>
+              <a:t>5/31/2019</a:t>
             </a:fld>
             <a:endParaRPr lang="en-US" dirty="0"/>
           </a:p>
@@ -3184,7 +3184,7 @@
           <a:p>
             <a:fld id="{CB91E35E-F34C-4F0E-B8A1-D9F5F49CB3AD}" type="datetimeFigureOut">
               <a:rPr lang="en-US" smtClean="0"/>
-              <a:t>5/29/2019</a:t>
+              <a:t>5/31/2019</a:t>
             </a:fld>
             <a:endParaRPr lang="en-US" dirty="0"/>
           </a:p>
@@ -3949,7 +3949,7 @@
             <a:fld id="{B61BEF0D-F0BB-DE4B-95CE-6DB70DBA9567}" type="datetimeFigureOut">
               <a:rPr lang="en-US" smtClean="0"/>
               <a:pPr/>
-              <a:t>5/29/2019</a:t>
+              <a:t>5/31/2019</a:t>
             </a:fld>
             <a:endParaRPr lang="en-US" dirty="0"/>
           </a:p>
@@ -4213,7 +4213,7 @@
             <a:fld id="{B61BEF0D-F0BB-DE4B-95CE-6DB70DBA9567}" type="datetimeFigureOut">
               <a:rPr lang="en-US" smtClean="0"/>
               <a:pPr/>
-              <a:t>5/29/2019</a:t>
+              <a:t>5/31/2019</a:t>
             </a:fld>
             <a:endParaRPr lang="en-US" dirty="0"/>
           </a:p>
@@ -4450,7 +4450,7 @@
             <a:fld id="{B61BEF0D-F0BB-DE4B-95CE-6DB70DBA9567}" type="datetimeFigureOut">
               <a:rPr lang="en-US" smtClean="0"/>
               <a:pPr/>
-              <a:t>5/29/2019</a:t>
+              <a:t>5/31/2019</a:t>
             </a:fld>
             <a:endParaRPr lang="en-US" dirty="0"/>
           </a:p>
@@ -4692,7 +4692,7 @@
             <a:fld id="{B61BEF0D-F0BB-DE4B-95CE-6DB70DBA9567}" type="datetimeFigureOut">
               <a:rPr lang="en-US" smtClean="0"/>
               <a:pPr/>
-              <a:t>5/29/2019</a:t>
+              <a:t>5/31/2019</a:t>
             </a:fld>
             <a:endParaRPr lang="en-US" dirty="0"/>
           </a:p>
@@ -5001,7 +5001,7 @@
             <a:fld id="{B61BEF0D-F0BB-DE4B-95CE-6DB70DBA9567}" type="datetimeFigureOut">
               <a:rPr lang="en-US" smtClean="0"/>
               <a:pPr/>
-              <a:t>5/29/2019</a:t>
+              <a:t>5/31/2019</a:t>
             </a:fld>
             <a:endParaRPr lang="en-US" dirty="0"/>
           </a:p>
@@ -5305,7 +5305,7 @@
             <a:fld id="{B61BEF0D-F0BB-DE4B-95CE-6DB70DBA9567}" type="datetimeFigureOut">
               <a:rPr lang="en-US" smtClean="0"/>
               <a:pPr/>
-              <a:t>5/29/2019</a:t>
+              <a:t>5/31/2019</a:t>
             </a:fld>
             <a:endParaRPr lang="en-US" dirty="0"/>
           </a:p>
@@ -5729,7 +5729,7 @@
             <a:fld id="{B61BEF0D-F0BB-DE4B-95CE-6DB70DBA9567}" type="datetimeFigureOut">
               <a:rPr lang="en-US" smtClean="0"/>
               <a:pPr/>
-              <a:t>5/29/2019</a:t>
+              <a:t>5/31/2019</a:t>
             </a:fld>
             <a:endParaRPr lang="en-US" dirty="0"/>
           </a:p>
@@ -5826,7 +5826,7 @@
             <a:fld id="{B61BEF0D-F0BB-DE4B-95CE-6DB70DBA9567}" type="datetimeFigureOut">
               <a:rPr lang="en-US" smtClean="0"/>
               <a:pPr/>
-              <a:t>5/29/2019</a:t>
+              <a:t>5/31/2019</a:t>
             </a:fld>
             <a:endParaRPr lang="en-US" dirty="0"/>
           </a:p>
@@ -5990,7 +5990,7 @@
             <a:fld id="{B61BEF0D-F0BB-DE4B-95CE-6DB70DBA9567}" type="datetimeFigureOut">
               <a:rPr lang="en-US" smtClean="0"/>
               <a:pPr/>
-              <a:t>5/29/2019</a:t>
+              <a:t>5/31/2019</a:t>
             </a:fld>
             <a:endParaRPr lang="en-US" dirty="0"/>
           </a:p>
@@ -6370,7 +6370,7 @@
             <a:fld id="{B61BEF0D-F0BB-DE4B-95CE-6DB70DBA9567}" type="datetimeFigureOut">
               <a:rPr lang="en-US" smtClean="0"/>
               <a:pPr/>
-              <a:t>5/29/2019</a:t>
+              <a:t>5/31/2019</a:t>
             </a:fld>
             <a:endParaRPr lang="en-US" dirty="0"/>
           </a:p>
@@ -6661,7 +6661,7 @@
             <a:fld id="{B61BEF0D-F0BB-DE4B-95CE-6DB70DBA9567}" type="datetimeFigureOut">
               <a:rPr lang="en-US" smtClean="0"/>
               <a:pPr/>
-              <a:t>5/29/2019</a:t>
+              <a:t>5/31/2019</a:t>
             </a:fld>
             <a:endParaRPr lang="en-US" dirty="0"/>
           </a:p>
@@ -6874,7 +6874,7 @@
             <a:fld id="{B61BEF0D-F0BB-DE4B-95CE-6DB70DBA9567}" type="datetimeFigureOut">
               <a:rPr lang="en-US" smtClean="0"/>
               <a:pPr/>
-              <a:t>5/29/2019</a:t>
+              <a:t>5/31/2019</a:t>
             </a:fld>
             <a:endParaRPr lang="en-US" dirty="0"/>
           </a:p>
@@ -8440,7 +8440,7 @@
             <a:pPr lvl="0"/>
             <a:r>
               <a:rPr lang="de-DE" dirty="0"/>
-              <a:t>Anzeigen der lebenden Zellen auf der 8x8 LED Matrix</a:t>
+              <a:t>Zeilenweises Anzeigen der lebenden Zellen auf der 8x8 LED Matrix</a:t>
             </a:r>
             <a:endParaRPr lang="en-DE" dirty="0"/>
           </a:p>
@@ -8449,6 +8449,41 @@
             <a:r>
               <a:rPr lang="de-DE" dirty="0"/>
               <a:t>Berechnen der Anzahl der umliegenden lebenden Zellen (auch als lebenden Nachbarn bezeichnet)</a:t>
+            </a:r>
+          </a:p>
+          <a:p>
+            <a:pPr lvl="0"/>
+            <a:r>
+              <a:rPr lang="en-US" dirty="0"/>
+              <a:t>Den </a:t>
+            </a:r>
+            <a:r>
+              <a:rPr lang="en-US" dirty="0" err="1"/>
+              <a:t>Zustand</a:t>
+            </a:r>
+            <a:r>
+              <a:rPr lang="en-US" dirty="0"/>
+              <a:t> der </a:t>
+            </a:r>
+            <a:r>
+              <a:rPr lang="en-US" dirty="0" err="1"/>
+              <a:t>aktuellen</a:t>
+            </a:r>
+            <a:r>
+              <a:rPr lang="en-US" dirty="0"/>
+              <a:t> </a:t>
+            </a:r>
+            <a:r>
+              <a:rPr lang="en-US" dirty="0" err="1"/>
+              <a:t>Zellen</a:t>
+            </a:r>
+            <a:r>
+              <a:rPr lang="en-US" dirty="0"/>
+              <a:t> </a:t>
+            </a:r>
+            <a:r>
+              <a:rPr lang="en-US" dirty="0" err="1"/>
+              <a:t>bestimmen</a:t>
             </a:r>
             <a:endParaRPr lang="en-DE" dirty="0"/>
           </a:p>
@@ -8682,6 +8717,67 @@
                       </p:childTnLst>
                     </p:cTn>
                   </p:par>
+                  <p:par>
+                    <p:cTn id="18" fill="hold">
+                      <p:stCondLst>
+                        <p:cond delay="indefinite"/>
+                      </p:stCondLst>
+                      <p:childTnLst>
+                        <p:par>
+                          <p:cTn id="19" fill="hold">
+                            <p:stCondLst>
+                              <p:cond delay="0"/>
+                            </p:stCondLst>
+                            <p:childTnLst>
+                              <p:par>
+                                <p:cTn id="20" presetID="10" presetClass="entr" presetSubtype="0" fill="hold" grpId="0" nodeType="clickEffect">
+                                  <p:stCondLst>
+                                    <p:cond delay="0"/>
+                                  </p:stCondLst>
+                                  <p:childTnLst>
+                                    <p:set>
+                                      <p:cBhvr>
+                                        <p:cTn id="21" dur="1" fill="hold">
+                                          <p:stCondLst>
+                                            <p:cond delay="0"/>
+                                          </p:stCondLst>
+                                        </p:cTn>
+                                        <p:tgtEl>
+                                          <p:spTgt spid="3">
+                                            <p:txEl>
+                                              <p:pRg st="3" end="3"/>
+                                            </p:txEl>
+                                          </p:spTgt>
+                                        </p:tgtEl>
+                                        <p:attrNameLst>
+                                          <p:attrName>style.visibility</p:attrName>
+                                        </p:attrNameLst>
+                                      </p:cBhvr>
+                                      <p:to>
+                                        <p:strVal val="visible"/>
+                                      </p:to>
+                                    </p:set>
+                                    <p:animEffect transition="in" filter="fade">
+                                      <p:cBhvr>
+                                        <p:cTn id="22" dur="500"/>
+                                        <p:tgtEl>
+                                          <p:spTgt spid="3">
+                                            <p:txEl>
+                                              <p:pRg st="3" end="3"/>
+                                            </p:txEl>
+                                          </p:spTgt>
+                                        </p:tgtEl>
+                                      </p:cBhvr>
+                                    </p:animEffect>
+                                  </p:childTnLst>
+                                </p:cTn>
+                              </p:par>
+                            </p:childTnLst>
+                          </p:cTn>
+                        </p:par>
+                      </p:childTnLst>
+                    </p:cTn>
+                  </p:par>
                 </p:childTnLst>
               </p:cTn>
               <p:prevCondLst>
@@ -8811,6 +8907,17 @@
             <a:r>
               <a:rPr lang="en-US" dirty="0" err="1"/>
               <a:t>Randes</a:t>
+            </a:r>
+            <a:endParaRPr lang="en-US" dirty="0"/>
+          </a:p>
+          <a:p>
+            <a:r>
+              <a:rPr lang="en-US" dirty="0" err="1"/>
+              <a:t>Langsame</a:t>
+            </a:r>
+            <a:r>
+              <a:rPr lang="en-US" dirty="0"/>
+              <a:t> IDE</a:t>
             </a:r>
             <a:endParaRPr lang="en-DE" dirty="0"/>
           </a:p>
@@ -10187,12 +10294,11 @@
 </file>
 
 <file path=customXml/item1.xml><?xml version="1.0" encoding="utf-8"?>
-<?mso-contentType ?>
-<FormTemplates xmlns="http://schemas.microsoft.com/sharepoint/v3/contenttype/forms">
-  <Display>DocumentLibraryForm</Display>
-  <Edit>DocumentLibraryForm</Edit>
-  <New>DocumentLibraryForm</New>
-</FormTemplates>
+<p:properties xmlns:p="http://schemas.microsoft.com/office/2006/metadata/properties" xmlns:xsi="http://www.w3.org/2001/XMLSchema-instance" xmlns:pc="http://schemas.microsoft.com/office/infopath/2007/PartnerControls">
+  <documentManagement>
+    <MediaServiceKeyPoints xmlns="71af3243-3dd4-4a8d-8c0d-dd76da1f02a5" xsi:nil="true"/>
+  </documentManagement>
+</p:properties>
 </file>
 
 <file path=customXml/item2.xml><?xml version="1.0" encoding="utf-8"?>
@@ -10407,17 +10513,27 @@
 </file>
 
 <file path=customXml/item3.xml><?xml version="1.0" encoding="utf-8"?>
-<p:properties xmlns:p="http://schemas.microsoft.com/office/2006/metadata/properties" xmlns:xsi="http://www.w3.org/2001/XMLSchema-instance" xmlns:pc="http://schemas.microsoft.com/office/infopath/2007/PartnerControls">
-  <documentManagement>
-    <MediaServiceKeyPoints xmlns="71af3243-3dd4-4a8d-8c0d-dd76da1f02a5" xsi:nil="true"/>
-  </documentManagement>
-</p:properties>
+<?mso-contentType ?>
+<FormTemplates xmlns="http://schemas.microsoft.com/sharepoint/v3/contenttype/forms">
+  <Display>DocumentLibraryForm</Display>
+  <Edit>DocumentLibraryForm</Edit>
+  <New>DocumentLibraryForm</New>
+</FormTemplates>
 </file>
 
 <file path=customXml/itemProps1.xml><?xml version="1.0" encoding="utf-8"?>
-<ds:datastoreItem xmlns:ds="http://schemas.openxmlformats.org/officeDocument/2006/customXml" ds:itemID="{E3FC8A1C-A436-42C0-AC33-FAFFFAF219BC}">
+<ds:datastoreItem xmlns:ds="http://schemas.openxmlformats.org/officeDocument/2006/customXml" ds:itemID="{FF5C8BF1-B0E4-49A1-808F-40F2AD30E743}">
   <ds:schemaRefs>
-    <ds:schemaRef ds:uri="http://schemas.microsoft.com/sharepoint/v3/contenttype/forms"/>
+    <ds:schemaRef ds:uri="http://purl.org/dc/elements/1.1/"/>
+    <ds:schemaRef ds:uri="http://purl.org/dc/dcmitype/"/>
+    <ds:schemaRef ds:uri="http://schemas.microsoft.com/office/2006/metadata/properties"/>
+    <ds:schemaRef ds:uri="http://schemas.microsoft.com/office/2006/documentManagement/types"/>
+    <ds:schemaRef ds:uri="http://schemas.microsoft.com/office/infopath/2007/PartnerControls"/>
+    <ds:schemaRef ds:uri="http://schemas.openxmlformats.org/package/2006/metadata/core-properties"/>
+    <ds:schemaRef ds:uri="http://www.w3.org/XML/1998/namespace"/>
+    <ds:schemaRef ds:uri="16c05727-aa75-4e4a-9b5f-8a80a1165891"/>
+    <ds:schemaRef ds:uri="71af3243-3dd4-4a8d-8c0d-dd76da1f02a5"/>
+    <ds:schemaRef ds:uri="http://purl.org/dc/terms/"/>
   </ds:schemaRefs>
 </ds:datastoreItem>
 </file>
@@ -10442,18 +10558,9 @@
 </file>
 
 <file path=customXml/itemProps3.xml><?xml version="1.0" encoding="utf-8"?>
-<ds:datastoreItem xmlns:ds="http://schemas.openxmlformats.org/officeDocument/2006/customXml" ds:itemID="{FF5C8BF1-B0E4-49A1-808F-40F2AD30E743}">
+<ds:datastoreItem xmlns:ds="http://schemas.openxmlformats.org/officeDocument/2006/customXml" ds:itemID="{E3FC8A1C-A436-42C0-AC33-FAFFFAF219BC}">
   <ds:schemaRefs>
-    <ds:schemaRef ds:uri="http://purl.org/dc/elements/1.1/"/>
-    <ds:schemaRef ds:uri="http://purl.org/dc/dcmitype/"/>
-    <ds:schemaRef ds:uri="http://schemas.microsoft.com/office/2006/metadata/properties"/>
-    <ds:schemaRef ds:uri="http://schemas.microsoft.com/office/2006/documentManagement/types"/>
-    <ds:schemaRef ds:uri="http://schemas.microsoft.com/office/infopath/2007/PartnerControls"/>
-    <ds:schemaRef ds:uri="http://schemas.openxmlformats.org/package/2006/metadata/core-properties"/>
-    <ds:schemaRef ds:uri="http://www.w3.org/XML/1998/namespace"/>
-    <ds:schemaRef ds:uri="16c05727-aa75-4e4a-9b5f-8a80a1165891"/>
-    <ds:schemaRef ds:uri="71af3243-3dd4-4a8d-8c0d-dd76da1f02a5"/>
-    <ds:schemaRef ds:uri="http://purl.org/dc/terms/"/>
+    <ds:schemaRef ds:uri="http://schemas.microsoft.com/sharepoint/v3/contenttype/forms"/>
   </ds:schemaRefs>
 </ds:datastoreItem>
 </file>
</xml_diff>